<commit_message>
Final Commit with Fixed Pres Slides
</commit_message>
<xml_diff>
--- a/Presentation.pptx
+++ b/Presentation.pptx
@@ -7,19 +7,23 @@
     <p:sldMasterId id="2147483696" r:id="rId3"/>
   </p:sldMasterIdLst>
   <p:notesMasterIdLst>
-    <p:notesMasterId r:id="rId14"/>
+    <p:notesMasterId r:id="rId18"/>
   </p:notesMasterIdLst>
   <p:sldIdLst>
     <p:sldId id="265" r:id="rId4"/>
     <p:sldId id="260" r:id="rId5"/>
-    <p:sldId id="266" r:id="rId6"/>
-    <p:sldId id="267" r:id="rId7"/>
+    <p:sldId id="267" r:id="rId6"/>
+    <p:sldId id="274" r:id="rId7"/>
     <p:sldId id="268" r:id="rId8"/>
     <p:sldId id="269" r:id="rId9"/>
-    <p:sldId id="270" r:id="rId10"/>
-    <p:sldId id="271" r:id="rId11"/>
-    <p:sldId id="272" r:id="rId12"/>
-    <p:sldId id="264" r:id="rId13"/>
+    <p:sldId id="273" r:id="rId10"/>
+    <p:sldId id="270" r:id="rId11"/>
+    <p:sldId id="271" r:id="rId12"/>
+    <p:sldId id="272" r:id="rId13"/>
+    <p:sldId id="277" r:id="rId14"/>
+    <p:sldId id="276" r:id="rId15"/>
+    <p:sldId id="275" r:id="rId16"/>
+    <p:sldId id="264" r:id="rId17"/>
   </p:sldIdLst>
   <p:sldSz cx="9144000" cy="6858000" type="screen4x3"/>
   <p:notesSz cx="6858000" cy="9144000"/>
@@ -129,13 +133,17 @@
         <p14:section name="Content" id="{BA579E83-F3BD-4915-AB93-7E4782F374C7}">
           <p14:sldIdLst>
             <p14:sldId id="260"/>
-            <p14:sldId id="266"/>
             <p14:sldId id="267"/>
+            <p14:sldId id="274"/>
             <p14:sldId id="268"/>
             <p14:sldId id="269"/>
+            <p14:sldId id="273"/>
             <p14:sldId id="270"/>
             <p14:sldId id="271"/>
             <p14:sldId id="272"/>
+            <p14:sldId id="277"/>
+            <p14:sldId id="276"/>
+            <p14:sldId id="275"/>
           </p14:sldIdLst>
         </p14:section>
         <p14:section name="The End" id="{39AC92C4-B439-42FA-B8A5-5E53E5AF3627}">
@@ -252,7 +260,7 @@
           <a:p>
             <a:fld id="{5009B0EC-54CB-4EA8-82B3-BC511323A487}" type="datetimeFigureOut">
               <a:rPr lang="en-US" smtClean="0"/>
-              <a:t>1/19/2018</a:t>
+              <a:t>1/22/2018</a:t>
             </a:fld>
             <a:endParaRPr lang="en-US"/>
           </a:p>
@@ -758,7 +766,7 @@
                 <a:latin typeface="RubFlama"/>
                 <a:cs typeface="Arial" panose="020B0604020202020204" pitchFamily="34" charset="0"/>
               </a:rPr>
-              <a:t>19.01.2018</a:t>
+              <a:t>22.01.2018</a:t>
             </a:fld>
             <a:endParaRPr lang="en-US" sz="2000" b="0" noProof="0" dirty="0">
               <a:latin typeface="RubFlama"/>
@@ -2523,7 +2531,7 @@
                 <a:latin typeface="RubFlama"/>
                 <a:cs typeface="Arial" panose="020B0604020202020204" pitchFamily="34" charset="0"/>
               </a:rPr>
-              <a:t>19.01.2018</a:t>
+              <a:t>22.01.2018</a:t>
             </a:fld>
             <a:endParaRPr lang="en-US" sz="2000" b="0" noProof="0" dirty="0">
               <a:latin typeface="RubFlama"/>
@@ -3991,7 +3999,9 @@
         </p:nvSpPr>
         <p:spPr/>
         <p:txBody>
-          <a:bodyPr/>
+          <a:bodyPr>
+            <a:normAutofit/>
+          </a:bodyPr>
           <a:lstStyle/>
           <a:p>
             <a:r>
@@ -4039,15 +4049,7 @@
           <a:p>
             <a:r>
               <a:rPr lang="de-DE" sz="2200" dirty="0"/>
-              <a:t>Sebastian Maaßen, </a:t>
-            </a:r>
-            <a:r>
-              <a:rPr lang="de-DE" sz="2200" dirty="0" err="1"/>
-              <a:t>Berhold</a:t>
-            </a:r>
-            <a:r>
-              <a:rPr lang="de-DE" sz="2200" dirty="0"/>
-              <a:t> Dors, Jan Schaffranek</a:t>
+              <a:t>Sebastian Maaßen, Berthold Dors, Jan Schaffranek</a:t>
             </a:r>
           </a:p>
         </p:txBody>
@@ -4175,6 +4177,430 @@
 </file>
 
 <file path=ppt/slides/slide10.xml><?xml version="1.0" encoding="utf-8"?>
+<p:sld xmlns:a="http://schemas.openxmlformats.org/drawingml/2006/main" xmlns:r="http://schemas.openxmlformats.org/officeDocument/2006/relationships" xmlns:p="http://schemas.openxmlformats.org/presentationml/2006/main">
+  <p:cSld>
+    <p:spTree>
+      <p:nvGrpSpPr>
+        <p:cNvPr id="1" name=""/>
+        <p:cNvGrpSpPr/>
+        <p:nvPr/>
+      </p:nvGrpSpPr>
+      <p:grpSpPr>
+        <a:xfrm>
+          <a:off x="0" y="0"/>
+          <a:ext cx="0" cy="0"/>
+          <a:chOff x="0" y="0"/>
+          <a:chExt cx="0" cy="0"/>
+        </a:xfrm>
+      </p:grpSpPr>
+      <p:sp>
+        <p:nvSpPr>
+          <p:cNvPr id="4" name="Textplatzhalter 3"/>
+          <p:cNvSpPr>
+            <a:spLocks noGrp="1"/>
+          </p:cNvSpPr>
+          <p:nvPr>
+            <p:ph type="body" sz="quarter" idx="11"/>
+          </p:nvPr>
+        </p:nvSpPr>
+        <p:spPr/>
+        <p:txBody>
+          <a:bodyPr/>
+          <a:lstStyle/>
+          <a:p>
+            <a:r>
+              <a:rPr lang="de-DE" dirty="0" err="1"/>
+              <a:t>Results</a:t>
+            </a:r>
+            <a:endParaRPr lang="de-DE" dirty="0"/>
+          </a:p>
+        </p:txBody>
+      </p:sp>
+      <p:pic>
+        <p:nvPicPr>
+          <p:cNvPr id="6" name="Grafik 5">
+            <a:extLst>
+              <a:ext uri="{FF2B5EF4-FFF2-40B4-BE49-F238E27FC236}">
+                <a16:creationId xmlns:a16="http://schemas.microsoft.com/office/drawing/2014/main" id="{06447342-4E00-4179-AB17-49866FFD489B}"/>
+              </a:ext>
+            </a:extLst>
+          </p:cNvPr>
+          <p:cNvPicPr>
+            <a:picLocks noChangeAspect="1"/>
+          </p:cNvPicPr>
+          <p:nvPr/>
+        </p:nvPicPr>
+        <p:blipFill>
+          <a:blip r:embed="rId2">
+            <a:extLst>
+              <a:ext uri="{28A0092B-C50C-407E-A947-70E740481C1C}">
+                <a14:useLocalDpi xmlns:a14="http://schemas.microsoft.com/office/drawing/2010/main" val="0"/>
+              </a:ext>
+            </a:extLst>
+          </a:blip>
+          <a:stretch>
+            <a:fillRect/>
+          </a:stretch>
+        </p:blipFill>
+        <p:spPr>
+          <a:xfrm>
+            <a:off x="914392" y="1052736"/>
+            <a:ext cx="7315215" cy="5486411"/>
+          </a:xfrm>
+          <a:prstGeom prst="rect">
+            <a:avLst/>
+          </a:prstGeom>
+        </p:spPr>
+      </p:pic>
+    </p:spTree>
+    <p:extLst>
+      <p:ext uri="{BB962C8B-B14F-4D97-AF65-F5344CB8AC3E}">
+        <p14:creationId xmlns:p14="http://schemas.microsoft.com/office/powerpoint/2010/main" val="1343462525"/>
+      </p:ext>
+    </p:extLst>
+  </p:cSld>
+  <p:clrMapOvr>
+    <a:masterClrMapping/>
+  </p:clrMapOvr>
+  <mc:AlternateContent xmlns:mc="http://schemas.openxmlformats.org/markup-compatibility/2006" xmlns:p14="http://schemas.microsoft.com/office/powerpoint/2010/main">
+    <mc:Choice Requires="p14">
+      <p:transition p14:dur="10"/>
+    </mc:Choice>
+    <mc:Fallback xmlns="">
+      <p:transition/>
+    </mc:Fallback>
+  </mc:AlternateContent>
+</p:sld>
+</file>
+
+<file path=ppt/slides/slide11.xml><?xml version="1.0" encoding="utf-8"?>
+<p:sld xmlns:a="http://schemas.openxmlformats.org/drawingml/2006/main" xmlns:r="http://schemas.openxmlformats.org/officeDocument/2006/relationships" xmlns:p="http://schemas.openxmlformats.org/presentationml/2006/main">
+  <p:cSld>
+    <p:spTree>
+      <p:nvGrpSpPr>
+        <p:cNvPr id="1" name=""/>
+        <p:cNvGrpSpPr/>
+        <p:nvPr/>
+      </p:nvGrpSpPr>
+      <p:grpSpPr>
+        <a:xfrm>
+          <a:off x="0" y="0"/>
+          <a:ext cx="0" cy="0"/>
+          <a:chOff x="0" y="0"/>
+          <a:chExt cx="0" cy="0"/>
+        </a:xfrm>
+      </p:grpSpPr>
+      <p:sp>
+        <p:nvSpPr>
+          <p:cNvPr id="4" name="Textplatzhalter 3"/>
+          <p:cNvSpPr>
+            <a:spLocks noGrp="1"/>
+          </p:cNvSpPr>
+          <p:nvPr>
+            <p:ph type="body" sz="quarter" idx="11"/>
+          </p:nvPr>
+        </p:nvSpPr>
+        <p:spPr/>
+        <p:txBody>
+          <a:bodyPr/>
+          <a:lstStyle/>
+          <a:p>
+            <a:r>
+              <a:rPr lang="de-DE" dirty="0" err="1"/>
+              <a:t>Results</a:t>
+            </a:r>
+            <a:endParaRPr lang="de-DE" dirty="0"/>
+          </a:p>
+        </p:txBody>
+      </p:sp>
+      <p:pic>
+        <p:nvPicPr>
+          <p:cNvPr id="7" name="Grafik 6">
+            <a:extLst>
+              <a:ext uri="{FF2B5EF4-FFF2-40B4-BE49-F238E27FC236}">
+                <a16:creationId xmlns:a16="http://schemas.microsoft.com/office/drawing/2014/main" id="{F3F352E2-2BD9-4E6C-BFE1-1E67634969A6}"/>
+              </a:ext>
+            </a:extLst>
+          </p:cNvPr>
+          <p:cNvPicPr>
+            <a:picLocks noChangeAspect="1"/>
+          </p:cNvPicPr>
+          <p:nvPr/>
+        </p:nvPicPr>
+        <p:blipFill>
+          <a:blip r:embed="rId2">
+            <a:extLst>
+              <a:ext uri="{28A0092B-C50C-407E-A947-70E740481C1C}">
+                <a14:useLocalDpi xmlns:a14="http://schemas.microsoft.com/office/drawing/2010/main" val="0"/>
+              </a:ext>
+            </a:extLst>
+          </a:blip>
+          <a:stretch>
+            <a:fillRect/>
+          </a:stretch>
+        </p:blipFill>
+        <p:spPr>
+          <a:xfrm>
+            <a:off x="914392" y="1052736"/>
+            <a:ext cx="7315215" cy="5486411"/>
+          </a:xfrm>
+          <a:prstGeom prst="rect">
+            <a:avLst/>
+          </a:prstGeom>
+        </p:spPr>
+      </p:pic>
+    </p:spTree>
+    <p:extLst>
+      <p:ext uri="{BB962C8B-B14F-4D97-AF65-F5344CB8AC3E}">
+        <p14:creationId xmlns:p14="http://schemas.microsoft.com/office/powerpoint/2010/main" val="178717660"/>
+      </p:ext>
+    </p:extLst>
+  </p:cSld>
+  <p:clrMapOvr>
+    <a:masterClrMapping/>
+  </p:clrMapOvr>
+  <mc:AlternateContent xmlns:mc="http://schemas.openxmlformats.org/markup-compatibility/2006" xmlns:p14="http://schemas.microsoft.com/office/powerpoint/2010/main">
+    <mc:Choice Requires="p14">
+      <p:transition p14:dur="10"/>
+    </mc:Choice>
+    <mc:Fallback xmlns="">
+      <p:transition/>
+    </mc:Fallback>
+  </mc:AlternateContent>
+</p:sld>
+</file>
+
+<file path=ppt/slides/slide12.xml><?xml version="1.0" encoding="utf-8"?>
+<p:sld xmlns:a="http://schemas.openxmlformats.org/drawingml/2006/main" xmlns:r="http://schemas.openxmlformats.org/officeDocument/2006/relationships" xmlns:p="http://schemas.openxmlformats.org/presentationml/2006/main">
+  <p:cSld>
+    <p:spTree>
+      <p:nvGrpSpPr>
+        <p:cNvPr id="1" name=""/>
+        <p:cNvGrpSpPr/>
+        <p:nvPr/>
+      </p:nvGrpSpPr>
+      <p:grpSpPr>
+        <a:xfrm>
+          <a:off x="0" y="0"/>
+          <a:ext cx="0" cy="0"/>
+          <a:chOff x="0" y="0"/>
+          <a:chExt cx="0" cy="0"/>
+        </a:xfrm>
+      </p:grpSpPr>
+      <p:sp>
+        <p:nvSpPr>
+          <p:cNvPr id="4" name="Textplatzhalter 3"/>
+          <p:cNvSpPr>
+            <a:spLocks noGrp="1"/>
+          </p:cNvSpPr>
+          <p:nvPr>
+            <p:ph type="body" sz="quarter" idx="11"/>
+          </p:nvPr>
+        </p:nvSpPr>
+        <p:spPr/>
+        <p:txBody>
+          <a:bodyPr/>
+          <a:lstStyle/>
+          <a:p>
+            <a:r>
+              <a:rPr lang="de-DE" dirty="0" err="1"/>
+              <a:t>Results</a:t>
+            </a:r>
+            <a:endParaRPr lang="de-DE" dirty="0"/>
+          </a:p>
+        </p:txBody>
+      </p:sp>
+      <p:pic>
+        <p:nvPicPr>
+          <p:cNvPr id="5" name="Grafik 4">
+            <a:extLst>
+              <a:ext uri="{FF2B5EF4-FFF2-40B4-BE49-F238E27FC236}">
+                <a16:creationId xmlns:a16="http://schemas.microsoft.com/office/drawing/2014/main" id="{55268C4D-A730-44E5-9F16-0982E7FF1481}"/>
+              </a:ext>
+            </a:extLst>
+          </p:cNvPr>
+          <p:cNvPicPr>
+            <a:picLocks noChangeAspect="1"/>
+          </p:cNvPicPr>
+          <p:nvPr/>
+        </p:nvPicPr>
+        <p:blipFill>
+          <a:blip r:embed="rId2">
+            <a:extLst>
+              <a:ext uri="{28A0092B-C50C-407E-A947-70E740481C1C}">
+                <a14:useLocalDpi xmlns:a14="http://schemas.microsoft.com/office/drawing/2010/main" val="0"/>
+              </a:ext>
+            </a:extLst>
+          </a:blip>
+          <a:stretch>
+            <a:fillRect/>
+          </a:stretch>
+        </p:blipFill>
+        <p:spPr>
+          <a:xfrm>
+            <a:off x="914392" y="1052736"/>
+            <a:ext cx="7315215" cy="5486411"/>
+          </a:xfrm>
+          <a:prstGeom prst="rect">
+            <a:avLst/>
+          </a:prstGeom>
+        </p:spPr>
+      </p:pic>
+    </p:spTree>
+    <p:extLst>
+      <p:ext uri="{BB962C8B-B14F-4D97-AF65-F5344CB8AC3E}">
+        <p14:creationId xmlns:p14="http://schemas.microsoft.com/office/powerpoint/2010/main" val="4283176818"/>
+      </p:ext>
+    </p:extLst>
+  </p:cSld>
+  <p:clrMapOvr>
+    <a:masterClrMapping/>
+  </p:clrMapOvr>
+  <mc:AlternateContent xmlns:mc="http://schemas.openxmlformats.org/markup-compatibility/2006" xmlns:p14="http://schemas.microsoft.com/office/powerpoint/2010/main">
+    <mc:Choice Requires="p14">
+      <p:transition p14:dur="10"/>
+    </mc:Choice>
+    <mc:Fallback xmlns="">
+      <p:transition/>
+    </mc:Fallback>
+  </mc:AlternateContent>
+</p:sld>
+</file>
+
+<file path=ppt/slides/slide13.xml><?xml version="1.0" encoding="utf-8"?>
+<p:sld xmlns:a="http://schemas.openxmlformats.org/drawingml/2006/main" xmlns:r="http://schemas.openxmlformats.org/officeDocument/2006/relationships" xmlns:p="http://schemas.openxmlformats.org/presentationml/2006/main">
+  <p:cSld>
+    <p:spTree>
+      <p:nvGrpSpPr>
+        <p:cNvPr id="1" name=""/>
+        <p:cNvGrpSpPr/>
+        <p:nvPr/>
+      </p:nvGrpSpPr>
+      <p:grpSpPr>
+        <a:xfrm>
+          <a:off x="0" y="0"/>
+          <a:ext cx="0" cy="0"/>
+          <a:chOff x="0" y="0"/>
+          <a:chExt cx="0" cy="0"/>
+        </a:xfrm>
+      </p:grpSpPr>
+      <p:sp>
+        <p:nvSpPr>
+          <p:cNvPr id="4" name="Textplatzhalter 3"/>
+          <p:cNvSpPr>
+            <a:spLocks noGrp="1"/>
+          </p:cNvSpPr>
+          <p:nvPr>
+            <p:ph type="body" sz="quarter" idx="11"/>
+          </p:nvPr>
+        </p:nvSpPr>
+        <p:spPr/>
+        <p:txBody>
+          <a:bodyPr/>
+          <a:lstStyle/>
+          <a:p>
+            <a:r>
+              <a:rPr lang="de-DE" dirty="0" err="1"/>
+              <a:t>Results</a:t>
+            </a:r>
+            <a:endParaRPr lang="de-DE" dirty="0"/>
+          </a:p>
+        </p:txBody>
+      </p:sp>
+      <p:pic>
+        <p:nvPicPr>
+          <p:cNvPr id="3" name="Grafik 2">
+            <a:extLst>
+              <a:ext uri="{FF2B5EF4-FFF2-40B4-BE49-F238E27FC236}">
+                <a16:creationId xmlns:a16="http://schemas.microsoft.com/office/drawing/2014/main" id="{CEE5052D-82F9-4B78-B3ED-2303E2E96AB7}"/>
+              </a:ext>
+            </a:extLst>
+          </p:cNvPr>
+          <p:cNvPicPr>
+            <a:picLocks noChangeAspect="1"/>
+          </p:cNvPicPr>
+          <p:nvPr/>
+        </p:nvPicPr>
+        <p:blipFill>
+          <a:blip r:embed="rId2">
+            <a:extLst>
+              <a:ext uri="{28A0092B-C50C-407E-A947-70E740481C1C}">
+                <a14:useLocalDpi xmlns:a14="http://schemas.microsoft.com/office/drawing/2010/main" val="0"/>
+              </a:ext>
+            </a:extLst>
+          </a:blip>
+          <a:stretch>
+            <a:fillRect/>
+          </a:stretch>
+        </p:blipFill>
+        <p:spPr>
+          <a:xfrm>
+            <a:off x="2051720" y="1052736"/>
+            <a:ext cx="5233423" cy="3925067"/>
+          </a:xfrm>
+          <a:prstGeom prst="rect">
+            <a:avLst/>
+          </a:prstGeom>
+        </p:spPr>
+      </p:pic>
+      <p:pic>
+        <p:nvPicPr>
+          <p:cNvPr id="10" name="Grafik 9">
+            <a:extLst>
+              <a:ext uri="{FF2B5EF4-FFF2-40B4-BE49-F238E27FC236}">
+                <a16:creationId xmlns:a16="http://schemas.microsoft.com/office/drawing/2014/main" id="{8974C1B3-53E7-401A-8232-7B23CC850291}"/>
+              </a:ext>
+            </a:extLst>
+          </p:cNvPr>
+          <p:cNvPicPr>
+            <a:picLocks noChangeAspect="1"/>
+          </p:cNvPicPr>
+          <p:nvPr/>
+        </p:nvPicPr>
+        <p:blipFill>
+          <a:blip r:embed="rId3">
+            <a:extLst>
+              <a:ext uri="{28A0092B-C50C-407E-A947-70E740481C1C}">
+                <a14:useLocalDpi xmlns:a14="http://schemas.microsoft.com/office/drawing/2010/main" val="0"/>
+              </a:ext>
+            </a:extLst>
+          </a:blip>
+          <a:stretch>
+            <a:fillRect/>
+          </a:stretch>
+        </p:blipFill>
+        <p:spPr>
+          <a:xfrm>
+            <a:off x="2426876" y="4980819"/>
+            <a:ext cx="4483110" cy="1471911"/>
+          </a:xfrm>
+          <a:prstGeom prst="rect">
+            <a:avLst/>
+          </a:prstGeom>
+        </p:spPr>
+      </p:pic>
+    </p:spTree>
+    <p:extLst>
+      <p:ext uri="{BB962C8B-B14F-4D97-AF65-F5344CB8AC3E}">
+        <p14:creationId xmlns:p14="http://schemas.microsoft.com/office/powerpoint/2010/main" val="1971728496"/>
+      </p:ext>
+    </p:extLst>
+  </p:cSld>
+  <p:clrMapOvr>
+    <a:masterClrMapping/>
+  </p:clrMapOvr>
+  <mc:AlternateContent xmlns:mc="http://schemas.openxmlformats.org/markup-compatibility/2006" xmlns:p14="http://schemas.microsoft.com/office/powerpoint/2010/main">
+    <mc:Choice Requires="p14">
+      <p:transition p14:dur="10"/>
+    </mc:Choice>
+    <mc:Fallback xmlns="">
+      <p:transition/>
+    </mc:Fallback>
+  </mc:AlternateContent>
+</p:sld>
+</file>
+
+<file path=ppt/slides/slide14.xml><?xml version="1.0" encoding="utf-8"?>
 <p:sld xmlns:a="http://schemas.openxmlformats.org/drawingml/2006/main" xmlns:r="http://schemas.openxmlformats.org/officeDocument/2006/relationships" xmlns:p="http://schemas.openxmlformats.org/presentationml/2006/main">
   <p:cSld>
     <p:spTree>
@@ -4289,17 +4715,6 @@
         <p:txBody>
           <a:bodyPr/>
           <a:lstStyle/>
-          <a:p>
-            <a:pPr>
-              <a:buFont typeface="Wingdings" panose="05000000000000000000" pitchFamily="2" charset="2"/>
-              <a:buChar char="§"/>
-            </a:pPr>
-            <a:r>
-              <a:rPr lang="de-DE" sz="3600" dirty="0" err="1"/>
-              <a:t>Introduction</a:t>
-            </a:r>
-            <a:endParaRPr lang="de-DE" sz="3600" dirty="0"/>
-          </a:p>
           <a:p>
             <a:pPr>
               <a:buFont typeface="Wingdings" panose="05000000000000000000" pitchFamily="2" charset="2"/>
@@ -4453,6 +4868,77 @@
           <a:bodyPr/>
           <a:lstStyle/>
           <a:p>
+            <a:r>
+              <a:rPr lang="de-DE" dirty="0"/>
+              <a:t>Standard </a:t>
+            </a:r>
+            <a:r>
+              <a:rPr lang="de-DE" dirty="0" err="1"/>
+              <a:t>encryption</a:t>
+            </a:r>
+            <a:r>
+              <a:rPr lang="de-DE" dirty="0"/>
+              <a:t> </a:t>
+            </a:r>
+            <a:r>
+              <a:rPr lang="de-DE" dirty="0" err="1"/>
+              <a:t>since</a:t>
+            </a:r>
+            <a:r>
+              <a:rPr lang="de-DE" dirty="0"/>
+              <a:t> 2001, </a:t>
+            </a:r>
+            <a:r>
+              <a:rPr lang="de-DE" dirty="0" err="1"/>
+              <a:t>replaced</a:t>
+            </a:r>
+            <a:r>
+              <a:rPr lang="de-DE" dirty="0"/>
+              <a:t> DES</a:t>
+            </a:r>
+          </a:p>
+          <a:p>
+            <a:endParaRPr lang="de-DE" dirty="0"/>
+          </a:p>
+          <a:p>
+            <a:r>
+              <a:rPr lang="de-DE" dirty="0" err="1"/>
+              <a:t>Symmetric</a:t>
+            </a:r>
+            <a:r>
+              <a:rPr lang="de-DE" dirty="0"/>
+              <a:t> block </a:t>
+            </a:r>
+            <a:r>
+              <a:rPr lang="de-DE" dirty="0" err="1"/>
+              <a:t>cipher</a:t>
+            </a:r>
+            <a:endParaRPr lang="de-DE" dirty="0"/>
+          </a:p>
+          <a:p>
+            <a:endParaRPr lang="de-DE" dirty="0"/>
+          </a:p>
+          <a:p>
+            <a:r>
+              <a:rPr lang="de-DE" dirty="0" err="1"/>
+              <a:t>No</a:t>
+            </a:r>
+            <a:r>
+              <a:rPr lang="de-DE" dirty="0"/>
+              <a:t> relevant </a:t>
+            </a:r>
+            <a:r>
+              <a:rPr lang="de-DE" dirty="0" err="1"/>
+              <a:t>practical</a:t>
+            </a:r>
+            <a:r>
+              <a:rPr lang="de-DE" dirty="0"/>
+              <a:t> </a:t>
+            </a:r>
+            <a:r>
+              <a:rPr lang="de-DE" dirty="0" err="1"/>
+              <a:t>attacks</a:t>
+            </a:r>
             <a:endParaRPr lang="de-DE" dirty="0"/>
           </a:p>
         </p:txBody>
@@ -4474,16 +4960,49 @@
           <a:p>
             <a:r>
               <a:rPr lang="de-DE" dirty="0" err="1"/>
-              <a:t>Introduction</a:t>
-            </a:r>
-            <a:endParaRPr lang="de-DE" dirty="0"/>
+              <a:t>Advanced</a:t>
+            </a:r>
+            <a:r>
+              <a:rPr lang="de-DE" dirty="0"/>
+              <a:t> Encryption Standard (AES)</a:t>
+            </a:r>
           </a:p>
         </p:txBody>
       </p:sp>
+      <p:pic>
+        <p:nvPicPr>
+          <p:cNvPr id="2" name="Grafik 1"/>
+          <p:cNvPicPr>
+            <a:picLocks noChangeAspect="1"/>
+          </p:cNvPicPr>
+          <p:nvPr/>
+        </p:nvPicPr>
+        <p:blipFill>
+          <a:blip r:embed="rId2">
+            <a:extLst>
+              <a:ext uri="{28A0092B-C50C-407E-A947-70E740481C1C}">
+                <a14:useLocalDpi xmlns:a14="http://schemas.microsoft.com/office/drawing/2010/main" val="0"/>
+              </a:ext>
+            </a:extLst>
+          </a:blip>
+          <a:stretch>
+            <a:fillRect/>
+          </a:stretch>
+        </p:blipFill>
+        <p:spPr>
+          <a:xfrm>
+            <a:off x="4644008" y="2996952"/>
+            <a:ext cx="4075700" cy="3168774"/>
+          </a:xfrm>
+          <a:prstGeom prst="rect">
+            <a:avLst/>
+          </a:prstGeom>
+        </p:spPr>
+      </p:pic>
     </p:spTree>
     <p:extLst>
       <p:ext uri="{BB962C8B-B14F-4D97-AF65-F5344CB8AC3E}">
-        <p14:creationId xmlns:p14="http://schemas.microsoft.com/office/powerpoint/2010/main" val="736701106"/>
+        <p14:creationId xmlns:p14="http://schemas.microsoft.com/office/powerpoint/2010/main" val="4276915883"/>
       </p:ext>
     </p:extLst>
   </p:cSld>
@@ -4520,25 +5039,6 @@
       </p:grpSpPr>
       <p:sp>
         <p:nvSpPr>
-          <p:cNvPr id="5" name="Textplatzhalter 4"/>
-          <p:cNvSpPr>
-            <a:spLocks noGrp="1"/>
-          </p:cNvSpPr>
-          <p:nvPr>
-            <p:ph type="body" sz="quarter" idx="12"/>
-          </p:nvPr>
-        </p:nvSpPr>
-        <p:spPr/>
-        <p:txBody>
-          <a:bodyPr/>
-          <a:lstStyle/>
-          <a:p>
-            <a:endParaRPr lang="de-DE" dirty="0"/>
-          </a:p>
-        </p:txBody>
-      </p:sp>
-      <p:sp>
-        <p:nvSpPr>
           <p:cNvPr id="4" name="Textplatzhalter 3"/>
           <p:cNvSpPr>
             <a:spLocks noGrp="1"/>
@@ -4563,10 +5063,33 @@
           </a:p>
         </p:txBody>
       </p:sp>
+      <p:pic>
+        <p:nvPicPr>
+          <p:cNvPr id="7" name="Grafik 6"/>
+          <p:cNvPicPr/>
+          <p:nvPr/>
+        </p:nvPicPr>
+        <p:blipFill>
+          <a:blip r:embed="rId2"/>
+          <a:stretch/>
+        </p:blipFill>
+        <p:spPr>
+          <a:xfrm>
+            <a:off x="779048" y="1484784"/>
+            <a:ext cx="7105320" cy="4276440"/>
+          </a:xfrm>
+          <a:prstGeom prst="rect">
+            <a:avLst/>
+          </a:prstGeom>
+          <a:ln>
+            <a:noFill/>
+          </a:ln>
+        </p:spPr>
+      </p:pic>
     </p:spTree>
     <p:extLst>
       <p:ext uri="{BB962C8B-B14F-4D97-AF65-F5344CB8AC3E}">
-        <p14:creationId xmlns:p14="http://schemas.microsoft.com/office/powerpoint/2010/main" val="4276915883"/>
+        <p14:creationId xmlns:p14="http://schemas.microsoft.com/office/powerpoint/2010/main" val="3757586610"/>
       </p:ext>
     </p:extLst>
   </p:cSld>
@@ -4616,7 +5139,290 @@
           <a:bodyPr/>
           <a:lstStyle/>
           <a:p>
+            <a:r>
+              <a:rPr lang="de-DE" dirty="0"/>
+              <a:t>Most intuitive </a:t>
+            </a:r>
+            <a:r>
+              <a:rPr lang="de-DE" dirty="0" err="1"/>
+              <a:t>approach</a:t>
+            </a:r>
+            <a:r>
+              <a:rPr lang="de-DE" dirty="0"/>
+              <a:t> </a:t>
+            </a:r>
+            <a:r>
+              <a:rPr lang="de-DE" dirty="0" err="1"/>
+              <a:t>for</a:t>
+            </a:r>
+            <a:br>
+              <a:rPr lang="de-DE" dirty="0"/>
+            </a:br>
+            <a:r>
+              <a:rPr lang="de-DE" dirty="0" err="1"/>
+              <a:t>messages</a:t>
+            </a:r>
+            <a:r>
+              <a:rPr lang="de-DE" dirty="0"/>
+              <a:t> larger </a:t>
+            </a:r>
+            <a:r>
+              <a:rPr lang="de-DE" dirty="0" err="1"/>
+              <a:t>than</a:t>
+            </a:r>
+            <a:r>
+              <a:rPr lang="de-DE" dirty="0"/>
+              <a:t> 128 Bit:</a:t>
+            </a:r>
+            <a:br>
+              <a:rPr lang="de-DE" dirty="0"/>
+            </a:br>
+            <a:r>
+              <a:rPr lang="de-DE" dirty="0"/>
+              <a:t>Electronic Code Book</a:t>
+            </a:r>
+          </a:p>
+          <a:p>
+            <a:r>
+              <a:rPr lang="de-DE" dirty="0" err="1"/>
+              <a:t>While</a:t>
+            </a:r>
+            <a:r>
+              <a:rPr lang="de-DE" dirty="0"/>
+              <a:t> </a:t>
+            </a:r>
+            <a:r>
+              <a:rPr lang="de-DE" dirty="0" err="1"/>
+              <a:t>working</a:t>
+            </a:r>
+            <a:r>
+              <a:rPr lang="de-DE" dirty="0"/>
+              <a:t> </a:t>
+            </a:r>
+            <a:r>
+              <a:rPr lang="de-DE" dirty="0" err="1"/>
+              <a:t>efficiently</a:t>
+            </a:r>
+            <a:r>
+              <a:rPr lang="de-DE" dirty="0"/>
+              <a:t> in </a:t>
+            </a:r>
+            <a:r>
+              <a:rPr lang="de-DE" dirty="0" err="1"/>
+              <a:t>both</a:t>
+            </a:r>
+            <a:br>
+              <a:rPr lang="de-DE" dirty="0"/>
+            </a:br>
+            <a:r>
+              <a:rPr lang="de-DE" dirty="0"/>
+              <a:t>en-/</a:t>
+            </a:r>
+            <a:r>
+              <a:rPr lang="de-DE" dirty="0" err="1"/>
+              <a:t>decryption</a:t>
+            </a:r>
+            <a:r>
+              <a:rPr lang="de-DE" dirty="0"/>
+              <a:t> (</a:t>
+            </a:r>
+            <a:r>
+              <a:rPr lang="de-DE" dirty="0" err="1"/>
+              <a:t>parallelization</a:t>
+            </a:r>
+            <a:r>
+              <a:rPr lang="de-DE" dirty="0"/>
+              <a:t>),</a:t>
+            </a:r>
+            <a:br>
+              <a:rPr lang="de-DE" dirty="0"/>
+            </a:br>
+            <a:r>
+              <a:rPr lang="de-DE" dirty="0" err="1"/>
+              <a:t>susceptible</a:t>
+            </a:r>
+            <a:r>
+              <a:rPr lang="de-DE" dirty="0"/>
+              <a:t> </a:t>
+            </a:r>
+            <a:r>
+              <a:rPr lang="de-DE" dirty="0" err="1"/>
+              <a:t>to</a:t>
+            </a:r>
+            <a:r>
+              <a:rPr lang="de-DE" dirty="0"/>
+              <a:t> </a:t>
+            </a:r>
+            <a:r>
+              <a:rPr lang="de-DE" dirty="0" err="1"/>
+              <a:t>attacks</a:t>
+            </a:r>
             <a:endParaRPr lang="de-DE" dirty="0"/>
+          </a:p>
+          <a:p>
+            <a:r>
+              <a:rPr lang="de-DE" dirty="0"/>
+              <a:t>Other </a:t>
+            </a:r>
+            <a:r>
+              <a:rPr lang="de-DE" dirty="0" err="1"/>
+              <a:t>modes</a:t>
+            </a:r>
+            <a:r>
+              <a:rPr lang="de-DE" dirty="0"/>
+              <a:t> </a:t>
+            </a:r>
+            <a:r>
+              <a:rPr lang="de-DE" dirty="0" err="1"/>
+              <a:t>had</a:t>
+            </a:r>
+            <a:r>
+              <a:rPr lang="de-DE" dirty="0"/>
+              <a:t> </a:t>
+            </a:r>
+            <a:r>
+              <a:rPr lang="de-DE" dirty="0" err="1"/>
+              <a:t>been</a:t>
+            </a:r>
+            <a:r>
+              <a:rPr lang="de-DE" dirty="0"/>
+              <a:t> </a:t>
+            </a:r>
+            <a:r>
+              <a:rPr lang="de-DE" dirty="0" err="1"/>
+              <a:t>introduced</a:t>
+            </a:r>
+            <a:br>
+              <a:rPr lang="de-DE" dirty="0"/>
+            </a:br>
+            <a:r>
+              <a:rPr lang="de-DE" dirty="0"/>
+              <a:t>in </a:t>
+            </a:r>
+            <a:r>
+              <a:rPr lang="de-DE" dirty="0" err="1"/>
+              <a:t>order</a:t>
+            </a:r>
+            <a:r>
+              <a:rPr lang="de-DE" dirty="0"/>
+              <a:t> </a:t>
+            </a:r>
+            <a:r>
+              <a:rPr lang="de-DE" dirty="0" err="1"/>
+              <a:t>to</a:t>
+            </a:r>
+            <a:r>
+              <a:rPr lang="de-DE" dirty="0"/>
+              <a:t> </a:t>
+            </a:r>
+            <a:r>
+              <a:rPr lang="de-DE" dirty="0" err="1"/>
+              <a:t>randomize</a:t>
+            </a:r>
+            <a:r>
+              <a:rPr lang="de-DE" dirty="0"/>
+              <a:t> </a:t>
+            </a:r>
+            <a:r>
+              <a:rPr lang="de-DE" dirty="0" err="1"/>
+              <a:t>encryptions</a:t>
+            </a:r>
+            <a:endParaRPr lang="de-DE" dirty="0"/>
+          </a:p>
+          <a:p>
+            <a:r>
+              <a:rPr lang="de-DE" dirty="0" err="1"/>
+              <a:t>One</a:t>
+            </a:r>
+            <a:r>
+              <a:rPr lang="de-DE" dirty="0"/>
+              <a:t> </a:t>
+            </a:r>
+            <a:r>
+              <a:rPr lang="de-DE" dirty="0" err="1"/>
+              <a:t>commonly</a:t>
+            </a:r>
+            <a:r>
+              <a:rPr lang="de-DE" dirty="0"/>
+              <a:t> </a:t>
+            </a:r>
+            <a:r>
+              <a:rPr lang="de-DE" dirty="0" err="1"/>
+              <a:t>used</a:t>
+            </a:r>
+            <a:r>
+              <a:rPr lang="de-DE" dirty="0"/>
+              <a:t> </a:t>
+            </a:r>
+            <a:r>
+              <a:rPr lang="de-DE" dirty="0" err="1"/>
+              <a:t>mode</a:t>
+            </a:r>
+            <a:r>
+              <a:rPr lang="de-DE" dirty="0"/>
+              <a:t>: </a:t>
+            </a:r>
+            <a:r>
+              <a:rPr lang="de-DE" dirty="0" err="1"/>
+              <a:t>counter</a:t>
+            </a:r>
+            <a:br>
+              <a:rPr lang="de-DE" dirty="0"/>
+            </a:br>
+            <a:r>
+              <a:rPr lang="de-DE" dirty="0" err="1"/>
+              <a:t>mode</a:t>
+            </a:r>
+            <a:endParaRPr lang="de-DE" dirty="0"/>
+          </a:p>
+          <a:p>
+            <a:r>
+              <a:rPr lang="de-DE" dirty="0" err="1"/>
+              <a:t>Some</a:t>
+            </a:r>
+            <a:r>
+              <a:rPr lang="de-DE" dirty="0"/>
+              <a:t> </a:t>
+            </a:r>
+            <a:r>
+              <a:rPr lang="de-DE" dirty="0" err="1"/>
+              <a:t>modes</a:t>
+            </a:r>
+            <a:r>
+              <a:rPr lang="de-DE" dirty="0"/>
+              <a:t> </a:t>
+            </a:r>
+            <a:r>
+              <a:rPr lang="de-DE" dirty="0" err="1"/>
+              <a:t>can</a:t>
+            </a:r>
+            <a:r>
+              <a:rPr lang="de-DE" dirty="0"/>
+              <a:t> </a:t>
+            </a:r>
+            <a:r>
+              <a:rPr lang="de-DE" dirty="0" err="1"/>
+              <a:t>be</a:t>
+            </a:r>
+            <a:r>
+              <a:rPr lang="de-DE" dirty="0"/>
+              <a:t> </a:t>
+            </a:r>
+            <a:r>
+              <a:rPr lang="de-DE" dirty="0" err="1"/>
+              <a:t>parallized</a:t>
+            </a:r>
+            <a:r>
+              <a:rPr lang="de-DE" dirty="0"/>
+              <a:t> </a:t>
+            </a:r>
+            <a:br>
+              <a:rPr lang="de-DE" dirty="0"/>
+            </a:br>
+            <a:r>
+              <a:rPr lang="de-DE" dirty="0"/>
+              <a:t>(e.g. Counter Mode, ECB)</a:t>
+            </a:r>
           </a:p>
         </p:txBody>
       </p:sp>
@@ -4642,6 +5448,52 @@
           </a:p>
         </p:txBody>
       </p:sp>
+      <p:pic>
+        <p:nvPicPr>
+          <p:cNvPr id="6" name="Grafik 5"/>
+          <p:cNvPicPr/>
+          <p:nvPr/>
+        </p:nvPicPr>
+        <p:blipFill>
+          <a:blip r:embed="rId2"/>
+          <a:stretch/>
+        </p:blipFill>
+        <p:spPr>
+          <a:xfrm>
+            <a:off x="5796136" y="1027442"/>
+            <a:ext cx="2781000" cy="2761920"/>
+          </a:xfrm>
+          <a:prstGeom prst="rect">
+            <a:avLst/>
+          </a:prstGeom>
+          <a:ln>
+            <a:noFill/>
+          </a:ln>
+        </p:spPr>
+      </p:pic>
+      <p:pic>
+        <p:nvPicPr>
+          <p:cNvPr id="7" name="Grafik 6"/>
+          <p:cNvPicPr/>
+          <p:nvPr/>
+        </p:nvPicPr>
+        <p:blipFill>
+          <a:blip r:embed="rId3"/>
+          <a:stretch/>
+        </p:blipFill>
+        <p:spPr>
+          <a:xfrm>
+            <a:off x="5742374" y="3958894"/>
+            <a:ext cx="3222114" cy="1990385"/>
+          </a:xfrm>
+          <a:prstGeom prst="rect">
+            <a:avLst/>
+          </a:prstGeom>
+          <a:ln>
+            <a:noFill/>
+          </a:ln>
+        </p:spPr>
+      </p:pic>
     </p:spTree>
     <p:extLst>
       <p:ext uri="{BB962C8B-B14F-4D97-AF65-F5344CB8AC3E}">
@@ -4695,7 +5547,254 @@
           <a:bodyPr/>
           <a:lstStyle/>
           <a:p>
+            <a:r>
+              <a:rPr lang="de-DE" dirty="0" err="1"/>
+              <a:t>Programming</a:t>
+            </a:r>
+            <a:r>
+              <a:rPr lang="de-DE" dirty="0"/>
+              <a:t> </a:t>
+            </a:r>
+            <a:r>
+              <a:rPr lang="de-DE" dirty="0" err="1"/>
+              <a:t>platform</a:t>
+            </a:r>
+            <a:r>
+              <a:rPr lang="de-DE" dirty="0"/>
+              <a:t> </a:t>
+            </a:r>
+            <a:r>
+              <a:rPr lang="de-DE" dirty="0" err="1"/>
+              <a:t>for</a:t>
+            </a:r>
+            <a:r>
+              <a:rPr lang="de-DE" dirty="0"/>
+              <a:t> NVIDIA GPUs</a:t>
+            </a:r>
+            <a:br>
+              <a:rPr lang="de-DE" dirty="0"/>
+            </a:br>
             <a:endParaRPr lang="de-DE" dirty="0"/>
+          </a:p>
+          <a:p>
+            <a:r>
+              <a:rPr lang="de-DE" dirty="0"/>
+              <a:t>„Extension“ </a:t>
+            </a:r>
+            <a:r>
+              <a:rPr lang="de-DE" dirty="0" err="1"/>
+              <a:t>of</a:t>
+            </a:r>
+            <a:r>
+              <a:rPr lang="de-DE" dirty="0"/>
+              <a:t> </a:t>
+            </a:r>
+            <a:r>
+              <a:rPr lang="de-DE" dirty="0" err="1"/>
+              <a:t>languages</a:t>
+            </a:r>
+            <a:r>
+              <a:rPr lang="de-DE" dirty="0"/>
+              <a:t> such </a:t>
+            </a:r>
+            <a:r>
+              <a:rPr lang="de-DE" dirty="0" err="1"/>
+              <a:t>as</a:t>
+            </a:r>
+            <a:r>
+              <a:rPr lang="de-DE" dirty="0"/>
+              <a:t> C, C++, Python, etc.</a:t>
+            </a:r>
+            <a:br>
+              <a:rPr lang="de-DE" dirty="0"/>
+            </a:br>
+            <a:endParaRPr lang="de-DE" dirty="0"/>
+          </a:p>
+          <a:p>
+            <a:r>
+              <a:rPr lang="de-DE" dirty="0"/>
+              <a:t>Basic additional </a:t>
+            </a:r>
+            <a:r>
+              <a:rPr lang="de-DE" dirty="0" err="1"/>
+              <a:t>keywords</a:t>
+            </a:r>
+            <a:r>
+              <a:rPr lang="de-DE" dirty="0"/>
+              <a:t>:</a:t>
+            </a:r>
+            <a:br>
+              <a:rPr lang="de-DE" dirty="0"/>
+            </a:br>
+            <a:r>
+              <a:rPr lang="de-DE" dirty="0"/>
+              <a:t>	</a:t>
+            </a:r>
+            <a:r>
+              <a:rPr lang="de-DE" i="1" dirty="0"/>
+              <a:t>__global__</a:t>
+            </a:r>
+            <a:r>
+              <a:rPr lang="de-DE" dirty="0"/>
+              <a:t>: </a:t>
+            </a:r>
+            <a:r>
+              <a:rPr lang="de-DE" dirty="0" err="1"/>
+              <a:t>Function</a:t>
+            </a:r>
+            <a:r>
+              <a:rPr lang="de-DE" dirty="0"/>
+              <a:t> </a:t>
+            </a:r>
+            <a:r>
+              <a:rPr lang="de-DE" dirty="0" err="1"/>
+              <a:t>that</a:t>
+            </a:r>
+            <a:r>
+              <a:rPr lang="de-DE" dirty="0"/>
+              <a:t> </a:t>
+            </a:r>
+            <a:r>
+              <a:rPr lang="de-DE" dirty="0" err="1"/>
+              <a:t>runs</a:t>
+            </a:r>
+            <a:r>
+              <a:rPr lang="de-DE" dirty="0"/>
+              <a:t> on </a:t>
+            </a:r>
+            <a:r>
+              <a:rPr lang="de-DE" dirty="0" err="1"/>
+              <a:t>the</a:t>
+            </a:r>
+            <a:r>
+              <a:rPr lang="de-DE" dirty="0"/>
+              <a:t> GPU (</a:t>
+            </a:r>
+            <a:r>
+              <a:rPr lang="de-DE" dirty="0" err="1"/>
+              <a:t>kernel</a:t>
+            </a:r>
+            <a:r>
+              <a:rPr lang="de-DE" dirty="0"/>
+              <a:t>)</a:t>
+            </a:r>
+            <a:br>
+              <a:rPr lang="de-DE" dirty="0"/>
+            </a:br>
+            <a:r>
+              <a:rPr lang="de-DE" dirty="0"/>
+              <a:t>		       [Host </a:t>
+            </a:r>
+            <a:r>
+              <a:rPr lang="de-DE" dirty="0" err="1"/>
+              <a:t>calls</a:t>
+            </a:r>
+            <a:r>
+              <a:rPr lang="de-DE" dirty="0"/>
+              <a:t> </a:t>
+            </a:r>
+            <a:r>
+              <a:rPr lang="de-DE" dirty="0" err="1"/>
+              <a:t>the</a:t>
+            </a:r>
+            <a:r>
+              <a:rPr lang="de-DE" dirty="0"/>
+              <a:t> </a:t>
+            </a:r>
+            <a:r>
+              <a:rPr lang="de-DE" dirty="0" err="1"/>
+              <a:t>device</a:t>
+            </a:r>
+            <a:r>
+              <a:rPr lang="de-DE" dirty="0"/>
+              <a:t> </a:t>
+            </a:r>
+            <a:r>
+              <a:rPr lang="de-DE" dirty="0" err="1"/>
+              <a:t>function</a:t>
+            </a:r>
+            <a:r>
+              <a:rPr lang="de-DE" dirty="0"/>
+              <a:t>]</a:t>
+            </a:r>
+            <a:br>
+              <a:rPr lang="de-DE" dirty="0"/>
+            </a:br>
+            <a:r>
+              <a:rPr lang="de-DE" dirty="0"/>
+              <a:t>	</a:t>
+            </a:r>
+            <a:r>
+              <a:rPr lang="de-DE" i="1" dirty="0"/>
+              <a:t>__</a:t>
+            </a:r>
+            <a:r>
+              <a:rPr lang="de-DE" i="1" dirty="0" err="1"/>
+              <a:t>device</a:t>
+            </a:r>
+            <a:r>
+              <a:rPr lang="de-DE" i="1" dirty="0"/>
+              <a:t>__</a:t>
+            </a:r>
+            <a:r>
+              <a:rPr lang="de-DE" dirty="0"/>
+              <a:t>: Helper </a:t>
+            </a:r>
+            <a:r>
+              <a:rPr lang="de-DE" dirty="0" err="1"/>
+              <a:t>function</a:t>
+            </a:r>
+            <a:r>
+              <a:rPr lang="de-DE" dirty="0"/>
+              <a:t>/</a:t>
+            </a:r>
+            <a:r>
+              <a:rPr lang="de-DE" dirty="0" err="1"/>
+              <a:t>memory</a:t>
+            </a:r>
+            <a:r>
+              <a:rPr lang="de-DE" dirty="0"/>
+              <a:t> on </a:t>
+            </a:r>
+            <a:r>
+              <a:rPr lang="de-DE" dirty="0" err="1"/>
+              <a:t>the</a:t>
+            </a:r>
+            <a:r>
+              <a:rPr lang="de-DE" dirty="0"/>
+              <a:t> GPU</a:t>
+            </a:r>
+            <a:br>
+              <a:rPr lang="de-DE" dirty="0"/>
+            </a:br>
+            <a:r>
+              <a:rPr lang="de-DE" dirty="0"/>
+              <a:t>		       [Device </a:t>
+            </a:r>
+            <a:r>
+              <a:rPr lang="de-DE" dirty="0" err="1"/>
+              <a:t>calls</a:t>
+            </a:r>
+            <a:r>
+              <a:rPr lang="de-DE" dirty="0"/>
+              <a:t> </a:t>
+            </a:r>
+            <a:r>
+              <a:rPr lang="de-DE" dirty="0" err="1"/>
+              <a:t>device</a:t>
+            </a:r>
+            <a:r>
+              <a:rPr lang="de-DE" dirty="0"/>
+              <a:t> </a:t>
+            </a:r>
+            <a:r>
+              <a:rPr lang="de-DE" dirty="0" err="1"/>
+              <a:t>funtion</a:t>
+            </a:r>
+            <a:r>
+              <a:rPr lang="de-DE" dirty="0"/>
+              <a:t>]</a:t>
+            </a:r>
           </a:p>
         </p:txBody>
       </p:sp>
@@ -4774,7 +5873,273 @@
           <a:bodyPr/>
           <a:lstStyle/>
           <a:p>
+            <a:r>
+              <a:rPr lang="de-DE" dirty="0"/>
+              <a:t>Syntax </a:t>
+            </a:r>
+            <a:r>
+              <a:rPr lang="de-DE" dirty="0" err="1"/>
+              <a:t>to</a:t>
+            </a:r>
+            <a:r>
+              <a:rPr lang="de-DE" dirty="0"/>
+              <a:t> </a:t>
+            </a:r>
+            <a:r>
+              <a:rPr lang="de-DE" dirty="0" err="1"/>
+              <a:t>launch</a:t>
+            </a:r>
+            <a:r>
+              <a:rPr lang="de-DE" dirty="0"/>
+              <a:t> a </a:t>
+            </a:r>
+            <a:r>
+              <a:rPr lang="de-DE" dirty="0" err="1"/>
+              <a:t>kernel</a:t>
+            </a:r>
+            <a:r>
+              <a:rPr lang="de-DE" dirty="0"/>
+              <a:t> </a:t>
+            </a:r>
+            <a:r>
+              <a:rPr lang="de-DE" dirty="0" err="1"/>
+              <a:t>function</a:t>
+            </a:r>
+            <a:r>
+              <a:rPr lang="de-DE" dirty="0"/>
+              <a:t>:</a:t>
+            </a:r>
+            <a:br>
+              <a:rPr lang="de-DE" dirty="0"/>
+            </a:br>
+            <a:r>
+              <a:rPr lang="de-DE" dirty="0"/>
+              <a:t>	</a:t>
+            </a:r>
+            <a:r>
+              <a:rPr lang="de-DE" i="1" dirty="0" err="1"/>
+              <a:t>kernel_func</a:t>
+            </a:r>
+            <a:r>
+              <a:rPr lang="de-DE" i="1" dirty="0"/>
+              <a:t>&lt;&lt;&lt;Blocks, </a:t>
+            </a:r>
+            <a:r>
+              <a:rPr lang="de-DE" i="1" dirty="0" err="1"/>
+              <a:t>ThreadsPerBlock</a:t>
+            </a:r>
+            <a:r>
+              <a:rPr lang="de-DE" i="1" dirty="0"/>
+              <a:t>&gt;&gt;&gt;(</a:t>
+            </a:r>
+            <a:r>
+              <a:rPr lang="de-DE" i="1" dirty="0" err="1"/>
+              <a:t>params</a:t>
+            </a:r>
+            <a:r>
+              <a:rPr lang="de-DE" i="1" dirty="0"/>
+              <a:t>)</a:t>
+            </a:r>
+            <a:br>
+              <a:rPr lang="de-DE" i="1" dirty="0"/>
+            </a:br>
+            <a:br>
+              <a:rPr lang="de-DE" dirty="0"/>
+            </a:br>
+            <a:br>
+              <a:rPr lang="de-DE" dirty="0"/>
+            </a:br>
+            <a:br>
+              <a:rPr lang="de-DE" dirty="0"/>
+            </a:br>
             <a:endParaRPr lang="de-DE" dirty="0"/>
+          </a:p>
+          <a:p>
+            <a:r>
+              <a:rPr lang="de-DE" dirty="0"/>
+              <a:t>Basic </a:t>
+            </a:r>
+            <a:r>
+              <a:rPr lang="de-DE" dirty="0" err="1"/>
+              <a:t>workflow</a:t>
+            </a:r>
+            <a:r>
+              <a:rPr lang="de-DE" dirty="0"/>
+              <a:t> </a:t>
+            </a:r>
+            <a:r>
+              <a:rPr lang="de-DE" dirty="0" err="1"/>
+              <a:t>of</a:t>
+            </a:r>
+            <a:r>
+              <a:rPr lang="de-DE" dirty="0"/>
+              <a:t> a CUDA </a:t>
+            </a:r>
+            <a:r>
+              <a:rPr lang="de-DE" dirty="0" err="1"/>
+              <a:t>program</a:t>
+            </a:r>
+            <a:r>
+              <a:rPr lang="de-DE" dirty="0"/>
+              <a:t>:</a:t>
+            </a:r>
+            <a:br>
+              <a:rPr lang="de-DE" dirty="0"/>
+            </a:br>
+            <a:r>
+              <a:rPr lang="de-DE" dirty="0"/>
+              <a:t>	1. </a:t>
+            </a:r>
+            <a:r>
+              <a:rPr lang="de-DE" dirty="0" err="1"/>
+              <a:t>Allocate</a:t>
+            </a:r>
+            <a:r>
+              <a:rPr lang="de-DE" dirty="0"/>
+              <a:t> </a:t>
+            </a:r>
+            <a:r>
+              <a:rPr lang="de-DE" dirty="0" err="1"/>
+              <a:t>and</a:t>
+            </a:r>
+            <a:r>
+              <a:rPr lang="de-DE" dirty="0"/>
+              <a:t> </a:t>
+            </a:r>
+            <a:r>
+              <a:rPr lang="de-DE" dirty="0" err="1"/>
+              <a:t>copy</a:t>
+            </a:r>
+            <a:r>
+              <a:rPr lang="de-DE" dirty="0"/>
+              <a:t> variables </a:t>
+            </a:r>
+            <a:r>
+              <a:rPr lang="de-DE" dirty="0" err="1"/>
+              <a:t>to</a:t>
+            </a:r>
+            <a:r>
+              <a:rPr lang="de-DE" dirty="0"/>
+              <a:t> </a:t>
+            </a:r>
+            <a:r>
+              <a:rPr lang="de-DE" dirty="0" err="1"/>
+              <a:t>the</a:t>
+            </a:r>
+            <a:r>
+              <a:rPr lang="de-DE" dirty="0"/>
+              <a:t> GPU</a:t>
+            </a:r>
+            <a:br>
+              <a:rPr lang="de-DE" dirty="0"/>
+            </a:br>
+            <a:r>
+              <a:rPr lang="de-DE" dirty="0"/>
+              <a:t>	2. Execute </a:t>
+            </a:r>
+            <a:r>
+              <a:rPr lang="de-DE" dirty="0" err="1"/>
+              <a:t>the</a:t>
+            </a:r>
+            <a:r>
+              <a:rPr lang="de-DE" dirty="0"/>
+              <a:t> </a:t>
+            </a:r>
+            <a:r>
+              <a:rPr lang="de-DE" dirty="0" err="1"/>
+              <a:t>kernel</a:t>
+            </a:r>
+            <a:r>
+              <a:rPr lang="de-DE" dirty="0"/>
+              <a:t> </a:t>
+            </a:r>
+            <a:r>
+              <a:rPr lang="de-DE" dirty="0" err="1"/>
+              <a:t>function</a:t>
+            </a:r>
+            <a:r>
+              <a:rPr lang="de-DE" dirty="0"/>
+              <a:t> </a:t>
+            </a:r>
+            <a:r>
+              <a:rPr lang="de-DE" dirty="0" err="1"/>
+              <a:t>with</a:t>
+            </a:r>
+            <a:r>
+              <a:rPr lang="de-DE" dirty="0"/>
+              <a:t> </a:t>
+            </a:r>
+            <a:r>
+              <a:rPr lang="de-DE" dirty="0" err="1"/>
+              <a:t>appropriate</a:t>
+            </a:r>
+            <a:r>
+              <a:rPr lang="de-DE" dirty="0"/>
+              <a:t> 			    </a:t>
+            </a:r>
+            <a:r>
+              <a:rPr lang="de-DE" dirty="0" err="1"/>
+              <a:t>numbers</a:t>
+            </a:r>
+            <a:r>
+              <a:rPr lang="de-DE" dirty="0"/>
+              <a:t> </a:t>
+            </a:r>
+            <a:r>
+              <a:rPr lang="de-DE" dirty="0" err="1"/>
+              <a:t>of</a:t>
+            </a:r>
+            <a:r>
+              <a:rPr lang="de-DE" dirty="0"/>
+              <a:t> Blocks and Threads</a:t>
+            </a:r>
+            <a:br>
+              <a:rPr lang="de-DE" dirty="0"/>
+            </a:br>
+            <a:r>
+              <a:rPr lang="de-DE" dirty="0"/>
+              <a:t>	3. </a:t>
+            </a:r>
+            <a:r>
+              <a:rPr lang="de-DE" dirty="0" err="1"/>
+              <a:t>Copy</a:t>
+            </a:r>
+            <a:r>
+              <a:rPr lang="de-DE" dirty="0"/>
+              <a:t> </a:t>
+            </a:r>
+            <a:r>
+              <a:rPr lang="de-DE" dirty="0" err="1"/>
+              <a:t>the</a:t>
+            </a:r>
+            <a:r>
+              <a:rPr lang="de-DE" dirty="0"/>
+              <a:t> </a:t>
+            </a:r>
+            <a:r>
+              <a:rPr lang="de-DE" dirty="0" err="1"/>
+              <a:t>results</a:t>
+            </a:r>
+            <a:r>
+              <a:rPr lang="de-DE" dirty="0"/>
+              <a:t> back </a:t>
+            </a:r>
+            <a:r>
+              <a:rPr lang="de-DE" dirty="0" err="1"/>
+              <a:t>to</a:t>
+            </a:r>
+            <a:r>
+              <a:rPr lang="de-DE" dirty="0"/>
+              <a:t> </a:t>
+            </a:r>
+            <a:r>
+              <a:rPr lang="de-DE" dirty="0" err="1"/>
+              <a:t>the</a:t>
+            </a:r>
+            <a:r>
+              <a:rPr lang="de-DE" dirty="0"/>
+              <a:t> CPU</a:t>
+            </a:r>
           </a:p>
         </p:txBody>
       </p:sp>
@@ -4795,20 +6160,45 @@
           <a:p>
             <a:r>
               <a:rPr lang="de-DE" dirty="0"/>
-              <a:t>CUDA - Thread </a:t>
-            </a:r>
-            <a:r>
-              <a:rPr lang="de-DE" dirty="0" err="1"/>
-              <a:t>Hierarchy</a:t>
-            </a:r>
-            <a:endParaRPr lang="de-DE" dirty="0"/>
+              <a:t>CUDA</a:t>
+            </a:r>
           </a:p>
         </p:txBody>
       </p:sp>
+      <p:pic>
+        <p:nvPicPr>
+          <p:cNvPr id="2" name="Grafik 1"/>
+          <p:cNvPicPr>
+            <a:picLocks noChangeAspect="1"/>
+          </p:cNvPicPr>
+          <p:nvPr/>
+        </p:nvPicPr>
+        <p:blipFill>
+          <a:blip r:embed="rId2">
+            <a:extLst>
+              <a:ext uri="{28A0092B-C50C-407E-A947-70E740481C1C}">
+                <a14:useLocalDpi xmlns:a14="http://schemas.microsoft.com/office/drawing/2010/main" val="0"/>
+              </a:ext>
+            </a:extLst>
+          </a:blip>
+          <a:stretch>
+            <a:fillRect/>
+          </a:stretch>
+        </p:blipFill>
+        <p:spPr>
+          <a:xfrm>
+            <a:off x="50802" y="2360125"/>
+            <a:ext cx="8985694" cy="780843"/>
+          </a:xfrm>
+          <a:prstGeom prst="rect">
+            <a:avLst/>
+          </a:prstGeom>
+        </p:spPr>
+      </p:pic>
     </p:spTree>
     <p:extLst>
       <p:ext uri="{BB962C8B-B14F-4D97-AF65-F5344CB8AC3E}">
-        <p14:creationId xmlns:p14="http://schemas.microsoft.com/office/powerpoint/2010/main" val="418945488"/>
+        <p14:creationId xmlns:p14="http://schemas.microsoft.com/office/powerpoint/2010/main" val="3623204683"/>
       </p:ext>
     </p:extLst>
   </p:cSld>
@@ -4858,7 +6248,207 @@
           <a:bodyPr/>
           <a:lstStyle/>
           <a:p>
+            <a:r>
+              <a:rPr lang="de-DE" dirty="0" err="1"/>
+              <a:t>Each</a:t>
+            </a:r>
+            <a:r>
+              <a:rPr lang="de-DE" dirty="0"/>
+              <a:t> kernel-</a:t>
+            </a:r>
+            <a:r>
+              <a:rPr lang="de-DE" dirty="0" err="1"/>
+              <a:t>call</a:t>
+            </a:r>
+            <a:r>
+              <a:rPr lang="de-DE" dirty="0"/>
+              <a:t> </a:t>
+            </a:r>
+            <a:r>
+              <a:rPr lang="de-DE" dirty="0" err="1"/>
+              <a:t>is</a:t>
+            </a:r>
+            <a:r>
+              <a:rPr lang="de-DE" dirty="0"/>
+              <a:t> </a:t>
+            </a:r>
+            <a:r>
+              <a:rPr lang="de-DE" dirty="0" err="1"/>
+              <a:t>specified</a:t>
+            </a:r>
+            <a:br>
+              <a:rPr lang="de-DE" dirty="0"/>
+            </a:br>
+            <a:r>
+              <a:rPr lang="de-DE" dirty="0" err="1"/>
+              <a:t>with</a:t>
+            </a:r>
+            <a:r>
+              <a:rPr lang="de-DE" dirty="0"/>
+              <a:t> a </a:t>
+            </a:r>
+            <a:r>
+              <a:rPr lang="de-DE" dirty="0" err="1"/>
+              <a:t>number</a:t>
+            </a:r>
+            <a:r>
+              <a:rPr lang="de-DE" dirty="0"/>
+              <a:t> </a:t>
+            </a:r>
+            <a:r>
+              <a:rPr lang="de-DE" dirty="0" err="1"/>
+              <a:t>of</a:t>
+            </a:r>
+            <a:r>
+              <a:rPr lang="de-DE" dirty="0"/>
+              <a:t> Blocks, </a:t>
+            </a:r>
+            <a:r>
+              <a:rPr lang="de-DE" dirty="0" err="1"/>
+              <a:t>called</a:t>
+            </a:r>
+            <a:br>
+              <a:rPr lang="de-DE" dirty="0"/>
+            </a:br>
+            <a:r>
+              <a:rPr lang="de-DE" dirty="0" err="1"/>
+              <a:t>the</a:t>
+            </a:r>
+            <a:r>
+              <a:rPr lang="de-DE" dirty="0"/>
+              <a:t> </a:t>
+            </a:r>
+            <a:r>
+              <a:rPr lang="de-DE" dirty="0" err="1"/>
+              <a:t>Grid</a:t>
+            </a:r>
             <a:endParaRPr lang="de-DE" dirty="0"/>
+          </a:p>
+          <a:p>
+            <a:r>
+              <a:rPr lang="de-DE" dirty="0" err="1"/>
+              <a:t>Each</a:t>
+            </a:r>
+            <a:r>
+              <a:rPr lang="de-DE" dirty="0"/>
+              <a:t> Block </a:t>
+            </a:r>
+            <a:r>
+              <a:rPr lang="de-DE" dirty="0" err="1"/>
+              <a:t>has</a:t>
+            </a:r>
+            <a:r>
+              <a:rPr lang="de-DE" dirty="0"/>
+              <a:t> a </a:t>
+            </a:r>
+            <a:r>
+              <a:rPr lang="de-DE" dirty="0" err="1"/>
+              <a:t>certain</a:t>
+            </a:r>
+            <a:r>
+              <a:rPr lang="de-DE" dirty="0"/>
+              <a:t> </a:t>
+            </a:r>
+            <a:r>
+              <a:rPr lang="de-DE" dirty="0" err="1"/>
+              <a:t>num</a:t>
+            </a:r>
+            <a:r>
+              <a:rPr lang="de-DE" dirty="0"/>
+              <a:t>-</a:t>
+            </a:r>
+            <a:br>
+              <a:rPr lang="de-DE" dirty="0"/>
+            </a:br>
+            <a:r>
+              <a:rPr lang="de-DE" dirty="0" err="1"/>
+              <a:t>ber</a:t>
+            </a:r>
+            <a:r>
+              <a:rPr lang="de-DE" dirty="0"/>
+              <a:t> </a:t>
+            </a:r>
+            <a:r>
+              <a:rPr lang="de-DE" dirty="0" err="1"/>
+              <a:t>of</a:t>
+            </a:r>
+            <a:r>
+              <a:rPr lang="de-DE" dirty="0"/>
+              <a:t> Threads</a:t>
+            </a:r>
+          </a:p>
+          <a:p>
+            <a:r>
+              <a:rPr lang="de-DE" dirty="0" err="1"/>
+              <a:t>You</a:t>
+            </a:r>
+            <a:r>
+              <a:rPr lang="de-DE" dirty="0"/>
+              <a:t> </a:t>
+            </a:r>
+            <a:r>
+              <a:rPr lang="de-DE" dirty="0" err="1"/>
+              <a:t>can</a:t>
+            </a:r>
+            <a:r>
+              <a:rPr lang="de-DE" dirty="0"/>
+              <a:t> </a:t>
+            </a:r>
+            <a:r>
+              <a:rPr lang="de-DE" dirty="0" err="1"/>
+              <a:t>access</a:t>
+            </a:r>
+            <a:r>
+              <a:rPr lang="de-DE" dirty="0"/>
+              <a:t> </a:t>
+            </a:r>
+            <a:r>
+              <a:rPr lang="de-DE" dirty="0" err="1"/>
+              <a:t>the</a:t>
+            </a:r>
+            <a:r>
+              <a:rPr lang="de-DE" dirty="0"/>
+              <a:t> </a:t>
+            </a:r>
+            <a:r>
+              <a:rPr lang="de-DE" dirty="0" err="1"/>
+              <a:t>actual</a:t>
+            </a:r>
+            <a:r>
+              <a:rPr lang="de-DE" dirty="0"/>
+              <a:t> Thread </a:t>
+            </a:r>
+            <a:br>
+              <a:rPr lang="de-DE" dirty="0"/>
+            </a:br>
+            <a:r>
+              <a:rPr lang="de-DE" dirty="0"/>
+              <a:t>and Block ID in </a:t>
+            </a:r>
+            <a:r>
+              <a:rPr lang="de-DE" dirty="0" err="1"/>
+              <a:t>your</a:t>
+            </a:r>
+            <a:r>
+              <a:rPr lang="de-DE" dirty="0"/>
+              <a:t> </a:t>
+            </a:r>
+            <a:r>
+              <a:rPr lang="de-DE" dirty="0" err="1"/>
+              <a:t>device</a:t>
+            </a:r>
+            <a:r>
+              <a:rPr lang="de-DE" dirty="0"/>
+              <a:t> </a:t>
+            </a:r>
+            <a:br>
+              <a:rPr lang="de-DE" dirty="0"/>
+            </a:br>
+            <a:r>
+              <a:rPr lang="de-DE" dirty="0" err="1"/>
+              <a:t>functions</a:t>
+            </a:r>
+            <a:endParaRPr lang="de-DE" i="1" dirty="0"/>
           </a:p>
         </p:txBody>
       </p:sp>
@@ -4879,15 +6469,50 @@
           <a:p>
             <a:r>
               <a:rPr lang="de-DE" dirty="0"/>
-              <a:t>CUDA – Memory Model</a:t>
-            </a:r>
+              <a:t>CUDA - Thread </a:t>
+            </a:r>
+            <a:r>
+              <a:rPr lang="de-DE" dirty="0" err="1"/>
+              <a:t>Hierarchy</a:t>
+            </a:r>
+            <a:endParaRPr lang="de-DE" dirty="0"/>
           </a:p>
         </p:txBody>
       </p:sp>
+      <p:pic>
+        <p:nvPicPr>
+          <p:cNvPr id="2" name="Grafik 1"/>
+          <p:cNvPicPr>
+            <a:picLocks noChangeAspect="1"/>
+          </p:cNvPicPr>
+          <p:nvPr/>
+        </p:nvPicPr>
+        <p:blipFill>
+          <a:blip r:embed="rId2">
+            <a:extLst>
+              <a:ext uri="{28A0092B-C50C-407E-A947-70E740481C1C}">
+                <a14:useLocalDpi xmlns:a14="http://schemas.microsoft.com/office/drawing/2010/main" val="0"/>
+              </a:ext>
+            </a:extLst>
+          </a:blip>
+          <a:stretch>
+            <a:fillRect/>
+          </a:stretch>
+        </p:blipFill>
+        <p:spPr>
+          <a:xfrm>
+            <a:off x="4973337" y="1216372"/>
+            <a:ext cx="4170663" cy="4936257"/>
+          </a:xfrm>
+          <a:prstGeom prst="rect">
+            <a:avLst/>
+          </a:prstGeom>
+        </p:spPr>
+      </p:pic>
     </p:spTree>
     <p:extLst>
       <p:ext uri="{BB962C8B-B14F-4D97-AF65-F5344CB8AC3E}">
-        <p14:creationId xmlns:p14="http://schemas.microsoft.com/office/powerpoint/2010/main" val="804545160"/>
+        <p14:creationId xmlns:p14="http://schemas.microsoft.com/office/powerpoint/2010/main" val="418945488"/>
       </p:ext>
     </p:extLst>
   </p:cSld>
@@ -4937,7 +6562,140 @@
           <a:bodyPr/>
           <a:lstStyle/>
           <a:p>
-            <a:endParaRPr lang="de-DE" dirty="0"/>
+            <a:r>
+              <a:rPr lang="de-DE" i="1" dirty="0"/>
+              <a:t>__</a:t>
+            </a:r>
+            <a:r>
+              <a:rPr lang="de-DE" i="1" dirty="0" err="1"/>
+              <a:t>device</a:t>
+            </a:r>
+            <a:r>
+              <a:rPr lang="de-DE" i="1" dirty="0"/>
+              <a:t>__</a:t>
+            </a:r>
+            <a:r>
+              <a:rPr lang="de-DE" dirty="0"/>
+              <a:t>: </a:t>
+            </a:r>
+            <a:r>
+              <a:rPr lang="de-DE" dirty="0" err="1"/>
+              <a:t>specifies</a:t>
+            </a:r>
+            <a:r>
+              <a:rPr lang="de-DE" dirty="0"/>
+              <a:t> global</a:t>
+            </a:r>
+            <a:br>
+              <a:rPr lang="de-DE" dirty="0"/>
+            </a:br>
+            <a:r>
+              <a:rPr lang="de-DE" dirty="0" err="1"/>
+              <a:t>memory</a:t>
+            </a:r>
+            <a:r>
+              <a:rPr lang="de-DE" dirty="0"/>
+              <a:t> (outside </a:t>
+            </a:r>
+            <a:r>
+              <a:rPr lang="de-DE" dirty="0" err="1"/>
+              <a:t>of</a:t>
+            </a:r>
+            <a:r>
+              <a:rPr lang="de-DE" dirty="0"/>
+              <a:t> </a:t>
+            </a:r>
+            <a:r>
+              <a:rPr lang="de-DE" dirty="0" err="1"/>
+              <a:t>func</a:t>
+            </a:r>
+            <a:r>
+              <a:rPr lang="de-DE" dirty="0"/>
+              <a:t>-</a:t>
+            </a:r>
+            <a:br>
+              <a:rPr lang="de-DE" dirty="0"/>
+            </a:br>
+            <a:r>
+              <a:rPr lang="de-DE" dirty="0" err="1"/>
+              <a:t>tions</a:t>
+            </a:r>
+            <a:r>
+              <a:rPr lang="de-DE" dirty="0"/>
+              <a:t>)</a:t>
+            </a:r>
+          </a:p>
+          <a:p>
+            <a:r>
+              <a:rPr lang="de-DE" i="1" dirty="0"/>
+              <a:t>__</a:t>
+            </a:r>
+            <a:r>
+              <a:rPr lang="de-DE" i="1" dirty="0" err="1"/>
+              <a:t>shared</a:t>
+            </a:r>
+            <a:r>
+              <a:rPr lang="de-DE" i="1" dirty="0"/>
+              <a:t>__</a:t>
+            </a:r>
+            <a:r>
+              <a:rPr lang="de-DE" dirty="0"/>
+              <a:t>: </a:t>
+            </a:r>
+            <a:r>
+              <a:rPr lang="de-DE" dirty="0" err="1"/>
+              <a:t>specifies</a:t>
+            </a:r>
+            <a:r>
+              <a:rPr lang="de-DE" dirty="0"/>
+              <a:t> </a:t>
+            </a:r>
+            <a:r>
+              <a:rPr lang="de-DE" dirty="0" err="1"/>
+              <a:t>shared</a:t>
+            </a:r>
+            <a:br>
+              <a:rPr lang="de-DE" dirty="0"/>
+            </a:br>
+            <a:r>
+              <a:rPr lang="de-DE" dirty="0" err="1"/>
+              <a:t>memory</a:t>
+            </a:r>
+            <a:r>
+              <a:rPr lang="de-DE" dirty="0"/>
+              <a:t> (</a:t>
+            </a:r>
+            <a:r>
+              <a:rPr lang="de-DE" dirty="0" err="1"/>
+              <a:t>inside</a:t>
+            </a:r>
+            <a:r>
+              <a:rPr lang="de-DE" dirty="0"/>
+              <a:t> </a:t>
+            </a:r>
+            <a:r>
+              <a:rPr lang="de-DE" dirty="0" err="1"/>
+              <a:t>of</a:t>
+            </a:r>
+            <a:r>
+              <a:rPr lang="de-DE" dirty="0"/>
+              <a:t> </a:t>
+            </a:r>
+            <a:r>
+              <a:rPr lang="de-DE" dirty="0" err="1"/>
+              <a:t>kernel</a:t>
+            </a:r>
+            <a:br>
+              <a:rPr lang="de-DE" dirty="0"/>
+            </a:br>
+            <a:r>
+              <a:rPr lang="de-DE" dirty="0" err="1"/>
+              <a:t>functions</a:t>
+            </a:r>
+            <a:r>
+              <a:rPr lang="de-DE" dirty="0"/>
+              <a:t>)</a:t>
+            </a:r>
           </a:p>
         </p:txBody>
       </p:sp>
@@ -4957,17 +6715,46 @@
           <a:lstStyle/>
           <a:p>
             <a:r>
-              <a:rPr lang="de-DE" dirty="0" err="1"/>
-              <a:t>Results</a:t>
-            </a:r>
-            <a:endParaRPr lang="de-DE" dirty="0"/>
+              <a:rPr lang="de-DE" dirty="0"/>
+              <a:t>CUDA – Memory Model</a:t>
+            </a:r>
           </a:p>
         </p:txBody>
       </p:sp>
+      <p:pic>
+        <p:nvPicPr>
+          <p:cNvPr id="2" name="Grafik 1"/>
+          <p:cNvPicPr>
+            <a:picLocks noChangeAspect="1"/>
+          </p:cNvPicPr>
+          <p:nvPr/>
+        </p:nvPicPr>
+        <p:blipFill>
+          <a:blip r:embed="rId2">
+            <a:extLst>
+              <a:ext uri="{28A0092B-C50C-407E-A947-70E740481C1C}">
+                <a14:useLocalDpi xmlns:a14="http://schemas.microsoft.com/office/drawing/2010/main" val="0"/>
+              </a:ext>
+            </a:extLst>
+          </a:blip>
+          <a:stretch>
+            <a:fillRect/>
+          </a:stretch>
+        </p:blipFill>
+        <p:spPr>
+          <a:xfrm>
+            <a:off x="4332106" y="1340768"/>
+            <a:ext cx="4721840" cy="4248472"/>
+          </a:xfrm>
+          <a:prstGeom prst="rect">
+            <a:avLst/>
+          </a:prstGeom>
+        </p:spPr>
+      </p:pic>
     </p:spTree>
     <p:extLst>
       <p:ext uri="{BB962C8B-B14F-4D97-AF65-F5344CB8AC3E}">
-        <p14:creationId xmlns:p14="http://schemas.microsoft.com/office/powerpoint/2010/main" val="1343462525"/>
+        <p14:creationId xmlns:p14="http://schemas.microsoft.com/office/powerpoint/2010/main" val="804545160"/>
       </p:ext>
     </p:extLst>
   </p:cSld>

</xml_diff>